<commit_message>
Minor formatting + Updated Test Plan
</commit_message>
<xml_diff>
--- a/GUITestPlan.pptx
+++ b/GUITestPlan.pptx
@@ -4278,7 +4278,7 @@
         </p:blipFill>
         <p:spPr>
           <a:xfrm>
-            <a:off x="1781175" y="1991519"/>
+            <a:off x="1781175" y="1760685"/>
             <a:ext cx="5581650" cy="3743325"/>
           </a:xfrm>
           <a:prstGeom prst="rect">
@@ -4286,6 +4286,100 @@
           </a:prstGeom>
         </p:spPr>
       </p:pic>
+      <p:sp>
+        <p:nvSpPr>
+          <p:cNvPr id="4" name="TextBox 3"/>
+          <p:cNvSpPr txBox="1"/>
+          <p:nvPr/>
+        </p:nvSpPr>
+        <p:spPr>
+          <a:xfrm>
+            <a:off x="0" y="5847058"/>
+            <a:ext cx="9144000" cy="923330"/>
+          </a:xfrm>
+          <a:prstGeom prst="rect">
+            <a:avLst/>
+          </a:prstGeom>
+          <a:noFill/>
+        </p:spPr>
+        <p:txBody>
+          <a:bodyPr wrap="square" rtlCol="0">
+            <a:spAutoFit/>
+          </a:bodyPr>
+          <a:lstStyle/>
+          <a:p>
+            <a:r>
+              <a:rPr lang="en-US" i="1" dirty="0"/>
+              <a:t>[</a:t>
+            </a:r>
+            <a:r>
+              <a:rPr lang="en-US" i="1" dirty="0" err="1"/>
+              <a:t>meanDailyBookings</a:t>
+            </a:r>
+            <a:r>
+              <a:rPr lang="en-US" i="1" dirty="0"/>
+              <a:t>=1300.0, </a:t>
+            </a:r>
+            <a:r>
+              <a:rPr lang="en-US" i="1" dirty="0" err="1"/>
+              <a:t>sdDailyBookings</a:t>
+            </a:r>
+            <a:r>
+              <a:rPr lang="en-US" i="1" dirty="0"/>
+              <a:t>=mean*0.33, seed=100, </a:t>
+            </a:r>
+            <a:r>
+              <a:rPr lang="en-US" i="1" dirty="0" err="1"/>
+              <a:t>firstProb</a:t>
+            </a:r>
+            <a:r>
+              <a:rPr lang="en-US" i="1" dirty="0"/>
+              <a:t>=0.3, </a:t>
+            </a:r>
+            <a:r>
+              <a:rPr lang="en-US" i="1" dirty="0" err="1"/>
+              <a:t>businessProb</a:t>
+            </a:r>
+            <a:r>
+              <a:rPr lang="en-US" i="1" dirty="0"/>
+              <a:t>=0.4, </a:t>
+            </a:r>
+            <a:r>
+              <a:rPr lang="en-US" i="1" dirty="0" err="1"/>
+              <a:t>premiumProb</a:t>
+            </a:r>
+            <a:r>
+              <a:rPr lang="en-US" i="1" dirty="0"/>
+              <a:t>=0.3, </a:t>
+            </a:r>
+            <a:r>
+              <a:rPr lang="en-US" i="1" dirty="0" err="1"/>
+              <a:t>economyProb</a:t>
+            </a:r>
+            <a:r>
+              <a:rPr lang="en-US" i="1" dirty="0"/>
+              <a:t>=0.7, </a:t>
+            </a:r>
+            <a:r>
+              <a:rPr lang="en-US" i="1" dirty="0" err="1"/>
+              <a:t>maxQueueSize</a:t>
+            </a:r>
+            <a:r>
+              <a:rPr lang="en-US" i="1" dirty="0"/>
+              <a:t>=500, </a:t>
+            </a:r>
+            <a:r>
+              <a:rPr lang="en-US" i="1" dirty="0" err="1"/>
+              <a:t>cancellationProb</a:t>
+            </a:r>
+            <a:r>
+              <a:rPr lang="en-US" i="1" dirty="0"/>
+              <a:t>=0.1] </a:t>
+            </a:r>
+            <a:endParaRPr lang="en-US" dirty="0"/>
+          </a:p>
+        </p:txBody>
+      </p:sp>
     </p:spTree>
   </p:cSld>
   <p:clrMapOvr>
@@ -4348,7 +4442,7 @@
         </p:blipFill>
         <p:spPr>
           <a:xfrm>
-            <a:off x="1785937" y="2001043"/>
+            <a:off x="1785937" y="1770210"/>
             <a:ext cx="5572125" cy="3724275"/>
           </a:xfrm>
           <a:prstGeom prst="rect">
@@ -4396,7 +4490,7 @@
             </a:r>
             <a:r>
               <a:rPr lang="en-US" i="1" dirty="0"/>
-              <a:t>=429.0, seed=100, </a:t>
+              <a:t>=mean*0.33, seed=100, </a:t>
             </a:r>
             <a:r>
               <a:rPr lang="en-US" i="1" dirty="0" err="1"/>
@@ -4436,7 +4530,7 @@
             </a:r>
             <a:r>
               <a:rPr lang="en-US" i="1" dirty="0"/>
-              <a:t>=0, </a:t>
+              <a:t>=500, </a:t>
             </a:r>
             <a:r>
               <a:rPr lang="en-US" i="1" dirty="0" err="1"/>
@@ -4444,7 +4538,7 @@
             </a:r>
             <a:r>
               <a:rPr lang="en-US" i="1" dirty="0"/>
-              <a:t>=1.0] </a:t>
+              <a:t>=0.1] </a:t>
             </a:r>
             <a:endParaRPr lang="en-US" dirty="0"/>
           </a:p>
@@ -4502,18 +4596,6 @@
           </a:p>
         </p:txBody>
       </p:sp>
-      <p:sp>
-        <p:nvSpPr>
-          <p:cNvPr id="2" name="Table Placeholder 1"/>
-          <p:cNvSpPr>
-            <a:spLocks noGrp="1"/>
-          </p:cNvSpPr>
-          <p:nvPr>
-            <p:ph type="tbl" idx="1"/>
-          </p:nvPr>
-        </p:nvSpPr>
-        <p:spPr/>
-      </p:sp>
       <p:pic>
         <p:nvPicPr>
           <p:cNvPr id="6" name="Picture 5"/>
@@ -4530,7 +4612,7 @@
         </p:blipFill>
         <p:spPr>
           <a:xfrm>
-            <a:off x="1781175" y="1991518"/>
+            <a:off x="1781175" y="1760685"/>
             <a:ext cx="5581650" cy="3743325"/>
           </a:xfrm>
           <a:prstGeom prst="rect">
@@ -4538,6 +4620,100 @@
           </a:prstGeom>
         </p:spPr>
       </p:pic>
+      <p:sp>
+        <p:nvSpPr>
+          <p:cNvPr id="5" name="TextBox 4"/>
+          <p:cNvSpPr txBox="1"/>
+          <p:nvPr/>
+        </p:nvSpPr>
+        <p:spPr>
+          <a:xfrm>
+            <a:off x="0" y="5847058"/>
+            <a:ext cx="9144000" cy="923330"/>
+          </a:xfrm>
+          <a:prstGeom prst="rect">
+            <a:avLst/>
+          </a:prstGeom>
+          <a:noFill/>
+        </p:spPr>
+        <p:txBody>
+          <a:bodyPr wrap="square" rtlCol="0">
+            <a:spAutoFit/>
+          </a:bodyPr>
+          <a:lstStyle/>
+          <a:p>
+            <a:r>
+              <a:rPr lang="en-US" i="1" dirty="0"/>
+              <a:t>[</a:t>
+            </a:r>
+            <a:r>
+              <a:rPr lang="en-US" i="1" dirty="0" err="1"/>
+              <a:t>meanDailyBookings</a:t>
+            </a:r>
+            <a:r>
+              <a:rPr lang="en-US" i="1" dirty="0"/>
+              <a:t>=-500, </a:t>
+            </a:r>
+            <a:r>
+              <a:rPr lang="en-US" i="1" dirty="0" err="1"/>
+              <a:t>sdDailyBookings</a:t>
+            </a:r>
+            <a:r>
+              <a:rPr lang="en-US" i="1" dirty="0"/>
+              <a:t>=mean*0.33, seed=100, </a:t>
+            </a:r>
+            <a:r>
+              <a:rPr lang="en-US" i="1" dirty="0" err="1"/>
+              <a:t>firstProb</a:t>
+            </a:r>
+            <a:r>
+              <a:rPr lang="en-US" i="1" dirty="0"/>
+              <a:t>=0.03, </a:t>
+            </a:r>
+            <a:r>
+              <a:rPr lang="en-US" i="1" dirty="0" err="1"/>
+              <a:t>businessProb</a:t>
+            </a:r>
+            <a:r>
+              <a:rPr lang="en-US" i="1" dirty="0"/>
+              <a:t>=0.14, </a:t>
+            </a:r>
+            <a:r>
+              <a:rPr lang="en-US" i="1" dirty="0" err="1"/>
+              <a:t>premiumProb</a:t>
+            </a:r>
+            <a:r>
+              <a:rPr lang="en-US" i="1" dirty="0"/>
+              <a:t>=0.13, </a:t>
+            </a:r>
+            <a:r>
+              <a:rPr lang="en-US" i="1" dirty="0" err="1"/>
+              <a:t>economyProb</a:t>
+            </a:r>
+            <a:r>
+              <a:rPr lang="en-US" i="1" dirty="0"/>
+              <a:t>=0.7, </a:t>
+            </a:r>
+            <a:r>
+              <a:rPr lang="en-US" i="1" dirty="0" err="1"/>
+              <a:t>maxQueueSize</a:t>
+            </a:r>
+            <a:r>
+              <a:rPr lang="en-US" i="1" dirty="0"/>
+              <a:t>=500, </a:t>
+            </a:r>
+            <a:r>
+              <a:rPr lang="en-US" i="1" dirty="0" err="1"/>
+              <a:t>cancellationProb</a:t>
+            </a:r>
+            <a:r>
+              <a:rPr lang="en-US" i="1" dirty="0"/>
+              <a:t>=0.1] </a:t>
+            </a:r>
+            <a:endParaRPr lang="en-US" dirty="0"/>
+          </a:p>
+        </p:txBody>
+      </p:sp>
     </p:spTree>
     <p:extLst>
       <p:ext uri="{BB962C8B-B14F-4D97-AF65-F5344CB8AC3E}">
@@ -4590,18 +4766,6 @@
           </a:p>
         </p:txBody>
       </p:sp>
-      <p:sp>
-        <p:nvSpPr>
-          <p:cNvPr id="2" name="Table Placeholder 1"/>
-          <p:cNvSpPr>
-            <a:spLocks noGrp="1"/>
-          </p:cNvSpPr>
-          <p:nvPr>
-            <p:ph type="tbl" idx="1"/>
-          </p:nvPr>
-        </p:nvSpPr>
-        <p:spPr/>
-      </p:sp>
       <p:pic>
         <p:nvPicPr>
           <p:cNvPr id="4" name="Picture 3"/>
@@ -4617,7 +4781,7 @@
         </p:blipFill>
         <p:spPr>
           <a:xfrm>
-            <a:off x="1790700" y="1996281"/>
+            <a:off x="1790700" y="1765448"/>
             <a:ext cx="5562600" cy="3733800"/>
           </a:xfrm>
           <a:prstGeom prst="rect">
@@ -4625,6 +4789,100 @@
           </a:prstGeom>
         </p:spPr>
       </p:pic>
+      <p:sp>
+        <p:nvSpPr>
+          <p:cNvPr id="5" name="TextBox 4"/>
+          <p:cNvSpPr txBox="1"/>
+          <p:nvPr/>
+        </p:nvSpPr>
+        <p:spPr>
+          <a:xfrm>
+            <a:off x="0" y="5847058"/>
+            <a:ext cx="9144000" cy="923330"/>
+          </a:xfrm>
+          <a:prstGeom prst="rect">
+            <a:avLst/>
+          </a:prstGeom>
+          <a:noFill/>
+        </p:spPr>
+        <p:txBody>
+          <a:bodyPr wrap="square" rtlCol="0">
+            <a:spAutoFit/>
+          </a:bodyPr>
+          <a:lstStyle/>
+          <a:p>
+            <a:r>
+              <a:rPr lang="en-US" i="1" dirty="0"/>
+              <a:t>[</a:t>
+            </a:r>
+            <a:r>
+              <a:rPr lang="en-US" i="1" dirty="0" err="1"/>
+              <a:t>meanDailyBookings</a:t>
+            </a:r>
+            <a:r>
+              <a:rPr lang="en-US" i="1" dirty="0"/>
+              <a:t>=-500, </a:t>
+            </a:r>
+            <a:r>
+              <a:rPr lang="en-US" i="1" dirty="0" err="1"/>
+              <a:t>sdDailyBookings</a:t>
+            </a:r>
+            <a:r>
+              <a:rPr lang="en-US" i="1" dirty="0"/>
+              <a:t>=mean*0.33, seed=100, </a:t>
+            </a:r>
+            <a:r>
+              <a:rPr lang="en-US" i="1" dirty="0" err="1"/>
+              <a:t>firstProb</a:t>
+            </a:r>
+            <a:r>
+              <a:rPr lang="en-US" i="1" dirty="0"/>
+              <a:t>=0.03, </a:t>
+            </a:r>
+            <a:r>
+              <a:rPr lang="en-US" i="1" dirty="0" err="1"/>
+              <a:t>businessProb</a:t>
+            </a:r>
+            <a:r>
+              <a:rPr lang="en-US" i="1" dirty="0"/>
+              <a:t>=0.14, </a:t>
+            </a:r>
+            <a:r>
+              <a:rPr lang="en-US" i="1" dirty="0" err="1"/>
+              <a:t>premiumProb</a:t>
+            </a:r>
+            <a:r>
+              <a:rPr lang="en-US" i="1" dirty="0"/>
+              <a:t>=0.13, </a:t>
+            </a:r>
+            <a:r>
+              <a:rPr lang="en-US" i="1" dirty="0" err="1"/>
+              <a:t>economyProb</a:t>
+            </a:r>
+            <a:r>
+              <a:rPr lang="en-US" i="1" dirty="0"/>
+              <a:t>=0.7, </a:t>
+            </a:r>
+            <a:r>
+              <a:rPr lang="en-US" i="1" dirty="0" err="1"/>
+              <a:t>maxQueueSize</a:t>
+            </a:r>
+            <a:r>
+              <a:rPr lang="en-US" i="1" dirty="0"/>
+              <a:t>=500, </a:t>
+            </a:r>
+            <a:r>
+              <a:rPr lang="en-US" i="1" dirty="0" err="1"/>
+              <a:t>cancellationProb</a:t>
+            </a:r>
+            <a:r>
+              <a:rPr lang="en-US" i="1" dirty="0"/>
+              <a:t>=0.1] </a:t>
+            </a:r>
+            <a:endParaRPr lang="en-US" dirty="0"/>
+          </a:p>
+        </p:txBody>
+      </p:sp>
     </p:spTree>
     <p:extLst>
       <p:ext uri="{BB962C8B-B14F-4D97-AF65-F5344CB8AC3E}">
@@ -4679,16 +4937,118 @@
       </p:sp>
       <p:sp>
         <p:nvSpPr>
-          <p:cNvPr id="2" name="Table Placeholder 1"/>
-          <p:cNvSpPr>
-            <a:spLocks noGrp="1"/>
-          </p:cNvSpPr>
-          <p:nvPr>
-            <p:ph type="tbl" idx="1"/>
-          </p:nvPr>
-        </p:nvSpPr>
-        <p:spPr/>
-      </p:sp>
+          <p:cNvPr id="4" name="TextBox 3"/>
+          <p:cNvSpPr txBox="1"/>
+          <p:nvPr/>
+        </p:nvSpPr>
+        <p:spPr>
+          <a:xfrm>
+            <a:off x="0" y="5847058"/>
+            <a:ext cx="9144000" cy="923330"/>
+          </a:xfrm>
+          <a:prstGeom prst="rect">
+            <a:avLst/>
+          </a:prstGeom>
+          <a:noFill/>
+        </p:spPr>
+        <p:txBody>
+          <a:bodyPr wrap="square" rtlCol="0">
+            <a:spAutoFit/>
+          </a:bodyPr>
+          <a:lstStyle/>
+          <a:p>
+            <a:r>
+              <a:rPr lang="en-US" i="1" dirty="0" err="1"/>
+              <a:t>meanDailyBookings</a:t>
+            </a:r>
+            <a:r>
+              <a:rPr lang="en-US" i="1" dirty="0"/>
+              <a:t>=1300.0, </a:t>
+            </a:r>
+            <a:r>
+              <a:rPr lang="en-US" i="1" dirty="0" err="1"/>
+              <a:t>sdDailyBookings</a:t>
+            </a:r>
+            <a:r>
+              <a:rPr lang="en-US" i="1" dirty="0"/>
+              <a:t>=429.0, seed=100, </a:t>
+            </a:r>
+            <a:r>
+              <a:rPr lang="en-US" i="1" dirty="0" err="1"/>
+              <a:t>firstProb</a:t>
+            </a:r>
+            <a:r>
+              <a:rPr lang="en-US" i="1" dirty="0"/>
+              <a:t>=0.03, </a:t>
+            </a:r>
+            <a:r>
+              <a:rPr lang="en-US" i="1" dirty="0" err="1"/>
+              <a:t>businessProb</a:t>
+            </a:r>
+            <a:r>
+              <a:rPr lang="en-US" i="1" dirty="0"/>
+              <a:t>=0.14, </a:t>
+            </a:r>
+            <a:r>
+              <a:rPr lang="en-US" i="1" dirty="0" err="1"/>
+              <a:t>premiumProb</a:t>
+            </a:r>
+            <a:r>
+              <a:rPr lang="en-US" i="1" dirty="0"/>
+              <a:t>=0.13, </a:t>
+            </a:r>
+            <a:r>
+              <a:rPr lang="en-US" i="1" dirty="0" err="1"/>
+              <a:t>economyProb</a:t>
+            </a:r>
+            <a:r>
+              <a:rPr lang="en-US" i="1" dirty="0"/>
+              <a:t>=0.7, </a:t>
+            </a:r>
+            <a:r>
+              <a:rPr lang="en-US" i="1" dirty="0" err="1"/>
+              <a:t>maxQueueSize</a:t>
+            </a:r>
+            <a:r>
+              <a:rPr lang="en-US" i="1" dirty="0"/>
+              <a:t>=0, </a:t>
+            </a:r>
+            <a:r>
+              <a:rPr lang="en-US" i="1" dirty="0" err="1"/>
+              <a:t>cancellationProb</a:t>
+            </a:r>
+            <a:r>
+              <a:rPr lang="en-US" i="1" dirty="0"/>
+              <a:t>=1.0] </a:t>
+            </a:r>
+            <a:endParaRPr lang="en-US" dirty="0"/>
+          </a:p>
+        </p:txBody>
+      </p:sp>
+      <p:pic>
+        <p:nvPicPr>
+          <p:cNvPr id="6" name="Picture 5"/>
+          <p:cNvPicPr>
+            <a:picLocks noChangeAspect="1"/>
+          </p:cNvPicPr>
+          <p:nvPr/>
+        </p:nvPicPr>
+        <p:blipFill>
+          <a:blip r:embed="rId2"/>
+          <a:stretch>
+            <a:fillRect/>
+          </a:stretch>
+        </p:blipFill>
+        <p:spPr>
+          <a:xfrm>
+            <a:off x="1781175" y="1760685"/>
+            <a:ext cx="5581650" cy="3743325"/>
+          </a:xfrm>
+          <a:prstGeom prst="rect">
+            <a:avLst/>
+          </a:prstGeom>
+        </p:spPr>
+      </p:pic>
     </p:spTree>
     <p:extLst>
       <p:ext uri="{BB962C8B-B14F-4D97-AF65-F5344CB8AC3E}">
@@ -4741,17 +5101,119 @@
           </a:p>
         </p:txBody>
       </p:sp>
-      <p:sp>
-        <p:nvSpPr>
-          <p:cNvPr id="2" name="Table Placeholder 1"/>
-          <p:cNvSpPr>
-            <a:spLocks noGrp="1"/>
-          </p:cNvSpPr>
-          <p:nvPr>
-            <p:ph type="tbl" idx="1"/>
-          </p:nvPr>
-        </p:nvSpPr>
-        <p:spPr/>
+      <p:pic>
+        <p:nvPicPr>
+          <p:cNvPr id="3" name="Picture 2"/>
+          <p:cNvPicPr>
+            <a:picLocks noChangeAspect="1"/>
+          </p:cNvPicPr>
+          <p:nvPr/>
+        </p:nvPicPr>
+        <p:blipFill>
+          <a:blip r:embed="rId2"/>
+          <a:stretch>
+            <a:fillRect/>
+          </a:stretch>
+        </p:blipFill>
+        <p:spPr>
+          <a:xfrm>
+            <a:off x="1781175" y="1760685"/>
+            <a:ext cx="5581650" cy="3743325"/>
+          </a:xfrm>
+          <a:prstGeom prst="rect">
+            <a:avLst/>
+          </a:prstGeom>
+        </p:spPr>
+      </p:pic>
+      <p:sp>
+        <p:nvSpPr>
+          <p:cNvPr id="5" name="TextBox 4"/>
+          <p:cNvSpPr txBox="1"/>
+          <p:nvPr/>
+        </p:nvSpPr>
+        <p:spPr>
+          <a:xfrm>
+            <a:off x="0" y="5847058"/>
+            <a:ext cx="9144000" cy="923330"/>
+          </a:xfrm>
+          <a:prstGeom prst="rect">
+            <a:avLst/>
+          </a:prstGeom>
+          <a:noFill/>
+        </p:spPr>
+        <p:txBody>
+          <a:bodyPr wrap="square" rtlCol="0">
+            <a:spAutoFit/>
+          </a:bodyPr>
+          <a:lstStyle/>
+          <a:p>
+            <a:r>
+              <a:rPr lang="en-US" i="1" dirty="0" err="1"/>
+              <a:t>meanDailyBookings</a:t>
+            </a:r>
+            <a:r>
+              <a:rPr lang="en-US" i="1" dirty="0"/>
+              <a:t>=1300.0, </a:t>
+            </a:r>
+            <a:r>
+              <a:rPr lang="en-US" i="1" dirty="0" err="1"/>
+              <a:t>sdDailyBookings</a:t>
+            </a:r>
+            <a:r>
+              <a:rPr lang="en-US" i="1" dirty="0"/>
+              <a:t>=429.0, seed=100, </a:t>
+            </a:r>
+            <a:r>
+              <a:rPr lang="en-US" i="1" dirty="0" err="1"/>
+              <a:t>firstProb</a:t>
+            </a:r>
+            <a:r>
+              <a:rPr lang="en-US" i="1" dirty="0"/>
+              <a:t>=0.03, </a:t>
+            </a:r>
+            <a:r>
+              <a:rPr lang="en-US" i="1" dirty="0" err="1"/>
+              <a:t>businessProb</a:t>
+            </a:r>
+            <a:r>
+              <a:rPr lang="en-US" i="1" dirty="0"/>
+              <a:t>=0.14, </a:t>
+            </a:r>
+            <a:r>
+              <a:rPr lang="en-US" i="1" dirty="0" err="1"/>
+              <a:t>premiumProb</a:t>
+            </a:r>
+            <a:r>
+              <a:rPr lang="en-US" i="1" dirty="0"/>
+              <a:t>=0.13, </a:t>
+            </a:r>
+            <a:r>
+              <a:rPr lang="en-US" i="1" dirty="0" err="1"/>
+              <a:t>economyProb</a:t>
+            </a:r>
+            <a:r>
+              <a:rPr lang="en-US" i="1" dirty="0"/>
+              <a:t>=0.7, </a:t>
+            </a:r>
+            <a:r>
+              <a:rPr lang="en-US" i="1" dirty="0" err="1"/>
+              <a:t>maxQueueSize</a:t>
+            </a:r>
+            <a:r>
+              <a:rPr lang="en-US" i="1" dirty="0"/>
+              <a:t>=0, </a:t>
+            </a:r>
+            <a:r>
+              <a:rPr lang="en-US" i="1" dirty="0" err="1"/>
+              <a:t>cancellationProb</a:t>
+            </a:r>
+            <a:r>
+              <a:rPr lang="en-US" i="1" dirty="0"/>
+              <a:t>=1.0] </a:t>
+            </a:r>
+            <a:endParaRPr lang="en-US" dirty="0"/>
+          </a:p>
+        </p:txBody>
       </p:sp>
     </p:spTree>
     <p:extLst>

</xml_diff>